<commit_message>
tutorial -- comments and refinements in conjunction with Melissa
</commit_message>
<xml_diff>
--- a/Tutorials/2013-XSEDE-BigJob/BigJob-XSEDE-2013.pptx
+++ b/Tutorials/2013-XSEDE-BigJob/BigJob-XSEDE-2013.pptx
@@ -1,6 +1,6 @@
 
 <file path=ppt/presentation.xml><?xml version="1.0" encoding="utf-8"?>
-<p:presentation xmlns:a="http://schemas.openxmlformats.org/drawingml/2006/main" xmlns:r="http://schemas.openxmlformats.org/officeDocument/2006/relationships" xmlns:p="http://schemas.openxmlformats.org/presentationml/2006/main" saveSubsetFonts="1" autoCompressPictures="0">
+<p:presentation xmlns:a="http://schemas.openxmlformats.org/drawingml/2006/main" xmlns:r="http://schemas.openxmlformats.org/officeDocument/2006/relationships" xmlns:mc="http://schemas.openxmlformats.org/markup-compatibility/2006" xmlns:mv="urn:schemas-microsoft-com:mac:vml" xmlns:p="http://schemas.openxmlformats.org/presentationml/2006/main" mc:Ignorable="mv" mc:PreserveAttributes="mv:*" saveSubsetFonts="1" autoCompressPictures="0">
   <p:sldMasterIdLst>
     <p:sldMasterId id="2147483648" r:id="rId1"/>
     <p:sldMasterId id="2147483897" r:id="rId2"/>
@@ -170,7 +170,7 @@
 </file>
 
 <file path=ppt/notesMasters/notesMaster1.xml><?xml version="1.0" encoding="utf-8"?>
-<p:notesMaster xmlns:a="http://schemas.openxmlformats.org/drawingml/2006/main" xmlns:r="http://schemas.openxmlformats.org/officeDocument/2006/relationships" xmlns:p="http://schemas.openxmlformats.org/presentationml/2006/main">
+<p:notesMaster xmlns:a="http://schemas.openxmlformats.org/drawingml/2006/main" xmlns:r="http://schemas.openxmlformats.org/officeDocument/2006/relationships" xmlns:mc="http://schemas.openxmlformats.org/markup-compatibility/2006" xmlns:mv="urn:schemas-microsoft-com:mac:vml" xmlns:p="http://schemas.openxmlformats.org/presentationml/2006/main" mc:Ignorable="mv" mc:PreserveAttributes="mv:*">
   <p:cSld>
     <p:bg>
       <p:bgRef idx="1001">
@@ -260,7 +260,7 @@
             <a:fld id="{8399529C-8CF2-47D0-BE85-DF833C9DE222}" type="datetime1">
               <a:rPr lang="en-US"/>
               <a:pPr/>
-              <a:t>3/4/13</a:t>
+              <a:t>3/6/13</a:t>
             </a:fld>
             <a:endParaRPr lang="en-US"/>
           </a:p>
@@ -446,7 +446,7 @@
     </p:spTree>
     <p:extLst>
       <p:ext uri="{BB962C8B-B14F-4D97-AF65-F5344CB8AC3E}">
-        <p14:creationId xmlns:p14="http://schemas.microsoft.com/office/powerpoint/2010/main" val="2049345630"/>
+        <p14:creationId xmlns:p14="http://schemas.microsoft.com/office/powerpoint/2010/main" xmlns:p="http://schemas.openxmlformats.org/presentationml/2006/main" xmlns:r="http://schemas.openxmlformats.org/officeDocument/2006/relationships" xmlns:a="http://schemas.openxmlformats.org/drawingml/2006/main" xmlns="" val="2049345630"/>
       </p:ext>
     </p:extLst>
   </p:cSld>
@@ -577,7 +577,204 @@
 </file>
 
 <file path=ppt/notesSlides/notesSlide1.xml><?xml version="1.0" encoding="utf-8"?>
-<p:notes xmlns:a="http://schemas.openxmlformats.org/drawingml/2006/main" xmlns:r="http://schemas.openxmlformats.org/officeDocument/2006/relationships" xmlns:p="http://schemas.openxmlformats.org/presentationml/2006/main">
+<p:notes xmlns:a="http://schemas.openxmlformats.org/drawingml/2006/main" xmlns:r="http://schemas.openxmlformats.org/officeDocument/2006/relationships" xmlns:mc="http://schemas.openxmlformats.org/markup-compatibility/2006" xmlns:mv="urn:schemas-microsoft-com:mac:vml" xmlns:p="http://schemas.openxmlformats.org/presentationml/2006/main" mc:Ignorable="mv" mc:PreserveAttributes="mv:*">
+  <p:cSld>
+    <p:spTree>
+      <p:nvGrpSpPr>
+        <p:cNvPr id="1" name=""/>
+        <p:cNvGrpSpPr/>
+        <p:nvPr/>
+      </p:nvGrpSpPr>
+      <p:grpSpPr>
+        <a:xfrm>
+          <a:off x="0" y="0"/>
+          <a:ext cx="0" cy="0"/>
+          <a:chOff x="0" y="0"/>
+          <a:chExt cx="0" cy="0"/>
+        </a:xfrm>
+      </p:grpSpPr>
+      <p:sp>
+        <p:nvSpPr>
+          <p:cNvPr id="2" name="Slide Image Placeholder 1"/>
+          <p:cNvSpPr>
+            <a:spLocks noGrp="1" noRot="1" noChangeAspect="1"/>
+          </p:cNvSpPr>
+          <p:nvPr>
+            <p:ph type="sldImg"/>
+          </p:nvPr>
+        </p:nvSpPr>
+        <p:spPr/>
+      </p:sp>
+      <p:sp>
+        <p:nvSpPr>
+          <p:cNvPr id="3" name="Notes Placeholder 2"/>
+          <p:cNvSpPr>
+            <a:spLocks noGrp="1"/>
+          </p:cNvSpPr>
+          <p:nvPr>
+            <p:ph type="body" idx="1"/>
+          </p:nvPr>
+        </p:nvSpPr>
+        <p:spPr/>
+        <p:txBody>
+          <a:bodyPr>
+            <a:normAutofit/>
+          </a:bodyPr>
+          <a:lstStyle/>
+          <a:p>
+            <a:r>
+              <a:rPr lang="en-US" dirty="0" smtClean="0"/>
+              <a:t>Let’s have</a:t>
+            </a:r>
+            <a:r>
+              <a:rPr lang="en-US" baseline="0" dirty="0" smtClean="0"/>
+              <a:t> a page about how </a:t>
+            </a:r>
+            <a:r>
+              <a:rPr lang="en-US" baseline="0" dirty="0" err="1" smtClean="0"/>
+              <a:t>BigJob</a:t>
+            </a:r>
+            <a:r>
+              <a:rPr lang="en-US" baseline="0" dirty="0" smtClean="0"/>
+              <a:t> is being used currently (</a:t>
+            </a:r>
+            <a:r>
+              <a:rPr lang="en-US" baseline="0" dirty="0" err="1" smtClean="0"/>
+              <a:t>i</a:t>
+            </a:r>
+            <a:r>
+              <a:rPr lang="en-US" baseline="0" dirty="0" smtClean="0"/>
+              <a:t>) support large-ensemble members/size (ii) run across XSEDE (iii) loosely-coupled workflow ---- in a nutshell how to decouple task execution from resource management!</a:t>
+            </a:r>
+          </a:p>
+          <a:p>
+            <a:endParaRPr lang="en-US" baseline="0" dirty="0" smtClean="0"/>
+          </a:p>
+          <a:p>
+            <a:endParaRPr lang="en-US" dirty="0"/>
+          </a:p>
+        </p:txBody>
+      </p:sp>
+      <p:sp>
+        <p:nvSpPr>
+          <p:cNvPr id="4" name="Slide Number Placeholder 3"/>
+          <p:cNvSpPr>
+            <a:spLocks noGrp="1"/>
+          </p:cNvSpPr>
+          <p:nvPr>
+            <p:ph type="sldNum" sz="quarter" idx="10"/>
+          </p:nvPr>
+        </p:nvSpPr>
+        <p:spPr/>
+        <p:txBody>
+          <a:bodyPr/>
+          <a:lstStyle/>
+          <a:p>
+            <a:fld id="{DB33103D-E25F-4175-8F1B-4D3F3D28B1BB}" type="slidenum">
+              <a:rPr lang="en-US" smtClean="0"/>
+              <a:pPr/>
+              <a:t>2</a:t>
+            </a:fld>
+            <a:endParaRPr lang="en-US"/>
+          </a:p>
+        </p:txBody>
+      </p:sp>
+    </p:spTree>
+  </p:cSld>
+  <p:clrMapOvr>
+    <a:masterClrMapping/>
+  </p:clrMapOvr>
+</p:notes>
+</file>
+
+<file path=ppt/notesSlides/notesSlide2.xml><?xml version="1.0" encoding="utf-8"?>
+<p:notes xmlns:a="http://schemas.openxmlformats.org/drawingml/2006/main" xmlns:r="http://schemas.openxmlformats.org/officeDocument/2006/relationships" xmlns:mc="http://schemas.openxmlformats.org/markup-compatibility/2006" xmlns:mv="urn:schemas-microsoft-com:mac:vml" xmlns:p="http://schemas.openxmlformats.org/presentationml/2006/main" mc:Ignorable="mv" mc:PreserveAttributes="mv:*">
+  <p:cSld>
+    <p:spTree>
+      <p:nvGrpSpPr>
+        <p:cNvPr id="1" name=""/>
+        <p:cNvGrpSpPr/>
+        <p:nvPr/>
+      </p:nvGrpSpPr>
+      <p:grpSpPr>
+        <a:xfrm>
+          <a:off x="0" y="0"/>
+          <a:ext cx="0" cy="0"/>
+          <a:chOff x="0" y="0"/>
+          <a:chExt cx="0" cy="0"/>
+        </a:xfrm>
+      </p:grpSpPr>
+      <p:sp>
+        <p:nvSpPr>
+          <p:cNvPr id="2" name="Slide Image Placeholder 1"/>
+          <p:cNvSpPr>
+            <a:spLocks noGrp="1" noRot="1" noChangeAspect="1"/>
+          </p:cNvSpPr>
+          <p:nvPr>
+            <p:ph type="sldImg"/>
+          </p:nvPr>
+        </p:nvSpPr>
+        <p:spPr/>
+      </p:sp>
+      <p:sp>
+        <p:nvSpPr>
+          <p:cNvPr id="3" name="Notes Placeholder 2"/>
+          <p:cNvSpPr>
+            <a:spLocks noGrp="1"/>
+          </p:cNvSpPr>
+          <p:nvPr>
+            <p:ph type="body" idx="1"/>
+          </p:nvPr>
+        </p:nvSpPr>
+        <p:spPr/>
+        <p:txBody>
+          <a:bodyPr>
+            <a:normAutofit/>
+          </a:bodyPr>
+          <a:lstStyle/>
+          <a:p>
+            <a:r>
+              <a:rPr lang="en-US" dirty="0" smtClean="0"/>
+              <a:t>Change Bliss to SAGA-Python</a:t>
+            </a:r>
+            <a:endParaRPr lang="en-US" dirty="0"/>
+          </a:p>
+        </p:txBody>
+      </p:sp>
+      <p:sp>
+        <p:nvSpPr>
+          <p:cNvPr id="4" name="Slide Number Placeholder 3"/>
+          <p:cNvSpPr>
+            <a:spLocks noGrp="1"/>
+          </p:cNvSpPr>
+          <p:nvPr>
+            <p:ph type="sldNum" sz="quarter" idx="10"/>
+          </p:nvPr>
+        </p:nvSpPr>
+        <p:spPr/>
+        <p:txBody>
+          <a:bodyPr/>
+          <a:lstStyle/>
+          <a:p>
+            <a:fld id="{DB33103D-E25F-4175-8F1B-4D3F3D28B1BB}" type="slidenum">
+              <a:rPr lang="en-US" smtClean="0"/>
+              <a:pPr/>
+              <a:t>3</a:t>
+            </a:fld>
+            <a:endParaRPr lang="en-US"/>
+          </a:p>
+        </p:txBody>
+      </p:sp>
+    </p:spTree>
+  </p:cSld>
+  <p:clrMapOvr>
+    <a:masterClrMapping/>
+  </p:clrMapOvr>
+</p:notes>
+</file>
+
+<file path=ppt/notesSlides/notesSlide3.xml><?xml version="1.0" encoding="utf-8"?>
+<p:notes xmlns:a="http://schemas.openxmlformats.org/drawingml/2006/main" xmlns:r="http://schemas.openxmlformats.org/officeDocument/2006/relationships" xmlns:mc="http://schemas.openxmlformats.org/markup-compatibility/2006" xmlns:mv="urn:schemas-microsoft-com:mac:vml" xmlns:p="http://schemas.openxmlformats.org/presentationml/2006/main" mc:Ignorable="mv" mc:PreserveAttributes="mv:*">
   <p:cSld>
     <p:spTree>
       <p:nvGrpSpPr>
@@ -659,7 +856,7 @@
     </p:spTree>
     <p:extLst>
       <p:ext uri="{BB962C8B-B14F-4D97-AF65-F5344CB8AC3E}">
-        <p14:creationId xmlns:p14="http://schemas.microsoft.com/office/powerpoint/2010/main" val="4279665447"/>
+        <p14:creationId xmlns:p14="http://schemas.microsoft.com/office/powerpoint/2010/main" xmlns:p="http://schemas.openxmlformats.org/presentationml/2006/main" xmlns:r="http://schemas.openxmlformats.org/officeDocument/2006/relationships" xmlns:a="http://schemas.openxmlformats.org/drawingml/2006/main" xmlns="" val="4279665447"/>
       </p:ext>
     </p:extLst>
   </p:cSld>
@@ -669,8 +866,8 @@
 </p:notes>
 </file>
 
-<file path=ppt/notesSlides/notesSlide2.xml><?xml version="1.0" encoding="utf-8"?>
-<p:notes xmlns:a="http://schemas.openxmlformats.org/drawingml/2006/main" xmlns:r="http://schemas.openxmlformats.org/officeDocument/2006/relationships" xmlns:p="http://schemas.openxmlformats.org/presentationml/2006/main">
+<file path=ppt/notesSlides/notesSlide4.xml><?xml version="1.0" encoding="utf-8"?>
+<p:notes xmlns:a="http://schemas.openxmlformats.org/drawingml/2006/main" xmlns:r="http://schemas.openxmlformats.org/officeDocument/2006/relationships" xmlns:mc="http://schemas.openxmlformats.org/markup-compatibility/2006" xmlns:mv="urn:schemas-microsoft-com:mac:vml" xmlns:p="http://schemas.openxmlformats.org/presentationml/2006/main" mc:Ignorable="mv" mc:PreserveAttributes="mv:*">
   <p:cSld>
     <p:spTree>
       <p:nvGrpSpPr>
@@ -756,7 +953,7 @@
     </p:spTree>
     <p:extLst>
       <p:ext uri="{BB962C8B-B14F-4D97-AF65-F5344CB8AC3E}">
-        <p14:creationId xmlns:p14="http://schemas.microsoft.com/office/powerpoint/2010/main" val="1765133474"/>
+        <p14:creationId xmlns:p14="http://schemas.microsoft.com/office/powerpoint/2010/main" xmlns:p="http://schemas.openxmlformats.org/presentationml/2006/main" xmlns:r="http://schemas.openxmlformats.org/officeDocument/2006/relationships" xmlns:a="http://schemas.openxmlformats.org/drawingml/2006/main" xmlns="" val="1765133474"/>
       </p:ext>
     </p:extLst>
   </p:cSld>
@@ -766,8 +963,8 @@
 </p:notes>
 </file>
 
-<file path=ppt/notesSlides/notesSlide3.xml><?xml version="1.0" encoding="utf-8"?>
-<p:notes xmlns:a="http://schemas.openxmlformats.org/drawingml/2006/main" xmlns:r="http://schemas.openxmlformats.org/officeDocument/2006/relationships" xmlns:p="http://schemas.openxmlformats.org/presentationml/2006/main">
+<file path=ppt/notesSlides/notesSlide5.xml><?xml version="1.0" encoding="utf-8"?>
+<p:notes xmlns:a="http://schemas.openxmlformats.org/drawingml/2006/main" xmlns:r="http://schemas.openxmlformats.org/officeDocument/2006/relationships" xmlns:mc="http://schemas.openxmlformats.org/markup-compatibility/2006" xmlns:mv="urn:schemas-microsoft-com:mac:vml" xmlns:p="http://schemas.openxmlformats.org/presentationml/2006/main" mc:Ignorable="mv" mc:PreserveAttributes="mv:*">
   <p:cSld>
     <p:spTree>
       <p:nvGrpSpPr>
@@ -849,7 +1046,7 @@
     </p:spTree>
     <p:extLst>
       <p:ext uri="{BB962C8B-B14F-4D97-AF65-F5344CB8AC3E}">
-        <p14:creationId xmlns:p14="http://schemas.microsoft.com/office/powerpoint/2010/main" val="903596127"/>
+        <p14:creationId xmlns:p14="http://schemas.microsoft.com/office/powerpoint/2010/main" xmlns:p="http://schemas.openxmlformats.org/presentationml/2006/main" xmlns:r="http://schemas.openxmlformats.org/officeDocument/2006/relationships" xmlns:a="http://schemas.openxmlformats.org/drawingml/2006/main" xmlns="" val="903596127"/>
       </p:ext>
     </p:extLst>
   </p:cSld>
@@ -860,7 +1057,7 @@
 </file>
 
 <file path=ppt/slideLayouts/slideLayout1.xml><?xml version="1.0" encoding="utf-8"?>
-<p:sldLayout xmlns:a="http://schemas.openxmlformats.org/drawingml/2006/main" xmlns:r="http://schemas.openxmlformats.org/officeDocument/2006/relationships" xmlns:p="http://schemas.openxmlformats.org/presentationml/2006/main" showMasterSp="0" type="title" preserve="1">
+<p:sldLayout xmlns:a="http://schemas.openxmlformats.org/drawingml/2006/main" xmlns:r="http://schemas.openxmlformats.org/officeDocument/2006/relationships" xmlns:mc="http://schemas.openxmlformats.org/markup-compatibility/2006" xmlns:mv="urn:schemas-microsoft-com:mac:vml" xmlns:p="http://schemas.openxmlformats.org/presentationml/2006/main" mc:Ignorable="mv" mc:PreserveAttributes="mv:*" showMasterSp="0" type="title" preserve="1">
   <p:cSld name="Title Slide">
     <p:spTree>
       <p:nvGrpSpPr>
@@ -989,7 +1186,7 @@
 </file>
 
 <file path=ppt/slideLayouts/slideLayout10.xml><?xml version="1.0" encoding="utf-8"?>
-<p:sldLayout xmlns:a="http://schemas.openxmlformats.org/drawingml/2006/main" xmlns:r="http://schemas.openxmlformats.org/officeDocument/2006/relationships" xmlns:p="http://schemas.openxmlformats.org/presentationml/2006/main" type="vertTx" preserve="1">
+<p:sldLayout xmlns:a="http://schemas.openxmlformats.org/drawingml/2006/main" xmlns:r="http://schemas.openxmlformats.org/officeDocument/2006/relationships" xmlns:mc="http://schemas.openxmlformats.org/markup-compatibility/2006" xmlns:mv="urn:schemas-microsoft-com:mac:vml" xmlns:p="http://schemas.openxmlformats.org/presentationml/2006/main" mc:Ignorable="mv" mc:PreserveAttributes="mv:*" type="vertTx" preserve="1">
   <p:cSld name="Title and Vertical Text">
     <p:spTree>
       <p:nvGrpSpPr>
@@ -1119,7 +1316,7 @@
 </file>
 
 <file path=ppt/slideLayouts/slideLayout11.xml><?xml version="1.0" encoding="utf-8"?>
-<p:sldLayout xmlns:a="http://schemas.openxmlformats.org/drawingml/2006/main" xmlns:r="http://schemas.openxmlformats.org/officeDocument/2006/relationships" xmlns:p="http://schemas.openxmlformats.org/presentationml/2006/main" type="vertTitleAndTx" preserve="1">
+<p:sldLayout xmlns:a="http://schemas.openxmlformats.org/drawingml/2006/main" xmlns:r="http://schemas.openxmlformats.org/officeDocument/2006/relationships" xmlns:mc="http://schemas.openxmlformats.org/markup-compatibility/2006" xmlns:mv="urn:schemas-microsoft-com:mac:vml" xmlns:p="http://schemas.openxmlformats.org/presentationml/2006/main" mc:Ignorable="mv" mc:PreserveAttributes="mv:*" type="vertTitleAndTx" preserve="1">
   <p:cSld name="Vertical Title and Text">
     <p:spTree>
       <p:nvGrpSpPr>
@@ -1259,7 +1456,7 @@
 </file>
 
 <file path=ppt/slideLayouts/slideLayout12.xml><?xml version="1.0" encoding="utf-8"?>
-<p:sldLayout xmlns:a="http://schemas.openxmlformats.org/drawingml/2006/main" xmlns:r="http://schemas.openxmlformats.org/officeDocument/2006/relationships" xmlns:p="http://schemas.openxmlformats.org/presentationml/2006/main" userDrawn="1">
+<p:sldLayout xmlns:a="http://schemas.openxmlformats.org/drawingml/2006/main" xmlns:r="http://schemas.openxmlformats.org/officeDocument/2006/relationships" xmlns:mc="http://schemas.openxmlformats.org/markup-compatibility/2006" xmlns:mv="urn:schemas-microsoft-com:mac:vml" xmlns:p="http://schemas.openxmlformats.org/presentationml/2006/main" mc:Ignorable="mv" mc:PreserveAttributes="mv:*" userDrawn="1">
   <p:cSld name="Base">
     <p:spTree>
       <p:nvGrpSpPr>
@@ -1610,7 +1807,7 @@
 </file>
 
 <file path=ppt/slideLayouts/slideLayout13.xml><?xml version="1.0" encoding="utf-8"?>
-<p:sldLayout xmlns:a="http://schemas.openxmlformats.org/drawingml/2006/main" xmlns:r="http://schemas.openxmlformats.org/officeDocument/2006/relationships" xmlns:p="http://schemas.openxmlformats.org/presentationml/2006/main" type="twoObj">
+<p:sldLayout xmlns:a="http://schemas.openxmlformats.org/drawingml/2006/main" xmlns:r="http://schemas.openxmlformats.org/officeDocument/2006/relationships" xmlns:mc="http://schemas.openxmlformats.org/markup-compatibility/2006" xmlns:mv="urn:schemas-microsoft-com:mac:vml" xmlns:p="http://schemas.openxmlformats.org/presentationml/2006/main" mc:Ignorable="mv" mc:PreserveAttributes="mv:*" type="twoObj">
   <p:cSld name="Two Content">
     <p:spTree>
       <p:nvGrpSpPr>
@@ -1845,7 +2042,7 @@
             <a:fld id="{46EC0482-A009-44C8-B0AA-A796A6FB8ABF}" type="datetime1">
               <a:rPr lang="en-US"/>
               <a:pPr/>
-              <a:t>3/4/13</a:t>
+              <a:t>3/6/13</a:t>
             </a:fld>
             <a:endParaRPr lang="en-US"/>
           </a:p>
@@ -1907,12 +2104,12 @@
   <p:clrMapOvr>
     <a:masterClrMapping/>
   </p:clrMapOvr>
-  <p:transition xmlns:p14="http://schemas.microsoft.com/office/powerpoint/2010/main" spd="med"/>
+  <p:transition spd="med"/>
 </p:sldLayout>
 </file>
 
 <file path=ppt/slideLayouts/slideLayout14.xml><?xml version="1.0" encoding="utf-8"?>
-<p:sldLayout xmlns:a="http://schemas.openxmlformats.org/drawingml/2006/main" xmlns:r="http://schemas.openxmlformats.org/officeDocument/2006/relationships" xmlns:p="http://schemas.openxmlformats.org/presentationml/2006/main" type="titleOnly">
+<p:sldLayout xmlns:a="http://schemas.openxmlformats.org/drawingml/2006/main" xmlns:r="http://schemas.openxmlformats.org/officeDocument/2006/relationships" xmlns:mc="http://schemas.openxmlformats.org/markup-compatibility/2006" xmlns:mv="urn:schemas-microsoft-com:mac:vml" xmlns:p="http://schemas.openxmlformats.org/presentationml/2006/main" mc:Ignorable="mv" mc:PreserveAttributes="mv:*" type="titleOnly">
   <p:cSld name="Title Only">
     <p:spTree>
       <p:nvGrpSpPr>
@@ -1973,7 +2170,7 @@
             <a:fld id="{FA22CAD1-A84A-40DA-B096-969086E92675}" type="datetime1">
               <a:rPr lang="en-US"/>
               <a:pPr/>
-              <a:t>3/4/13</a:t>
+              <a:t>3/6/13</a:t>
             </a:fld>
             <a:endParaRPr lang="en-US"/>
           </a:p>
@@ -2039,7 +2236,7 @@
 </file>
 
 <file path=ppt/slideLayouts/slideLayout2.xml><?xml version="1.0" encoding="utf-8"?>
-<p:sldLayout xmlns:a="http://schemas.openxmlformats.org/drawingml/2006/main" xmlns:r="http://schemas.openxmlformats.org/officeDocument/2006/relationships" xmlns:p="http://schemas.openxmlformats.org/presentationml/2006/main" type="obj" preserve="1">
+<p:sldLayout xmlns:a="http://schemas.openxmlformats.org/drawingml/2006/main" xmlns:r="http://schemas.openxmlformats.org/officeDocument/2006/relationships" xmlns:mc="http://schemas.openxmlformats.org/markup-compatibility/2006" xmlns:mv="urn:schemas-microsoft-com:mac:vml" xmlns:p="http://schemas.openxmlformats.org/presentationml/2006/main" mc:Ignorable="mv" mc:PreserveAttributes="mv:*" type="obj" preserve="1">
   <p:cSld name="Title and Content">
     <p:spTree>
       <p:nvGrpSpPr>
@@ -2169,7 +2366,7 @@
 </file>
 
 <file path=ppt/slideLayouts/slideLayout3.xml><?xml version="1.0" encoding="utf-8"?>
-<p:sldLayout xmlns:a="http://schemas.openxmlformats.org/drawingml/2006/main" xmlns:r="http://schemas.openxmlformats.org/officeDocument/2006/relationships" xmlns:p="http://schemas.openxmlformats.org/presentationml/2006/main" type="secHead" preserve="1">
+<p:sldLayout xmlns:a="http://schemas.openxmlformats.org/drawingml/2006/main" xmlns:r="http://schemas.openxmlformats.org/officeDocument/2006/relationships" xmlns:mc="http://schemas.openxmlformats.org/markup-compatibility/2006" xmlns:mv="urn:schemas-microsoft-com:mac:vml" xmlns:p="http://schemas.openxmlformats.org/presentationml/2006/main" mc:Ignorable="mv" mc:PreserveAttributes="mv:*" type="secHead" preserve="1">
   <p:cSld name="Section Header">
     <p:spTree>
       <p:nvGrpSpPr>
@@ -2321,7 +2518,7 @@
 </file>
 
 <file path=ppt/slideLayouts/slideLayout4.xml><?xml version="1.0" encoding="utf-8"?>
-<p:sldLayout xmlns:a="http://schemas.openxmlformats.org/drawingml/2006/main" xmlns:r="http://schemas.openxmlformats.org/officeDocument/2006/relationships" xmlns:p="http://schemas.openxmlformats.org/presentationml/2006/main" type="twoObj" preserve="1">
+<p:sldLayout xmlns:a="http://schemas.openxmlformats.org/drawingml/2006/main" xmlns:r="http://schemas.openxmlformats.org/officeDocument/2006/relationships" xmlns:mc="http://schemas.openxmlformats.org/markup-compatibility/2006" xmlns:mv="urn:schemas-microsoft-com:mac:vml" xmlns:p="http://schemas.openxmlformats.org/presentationml/2006/main" mc:Ignorable="mv" mc:PreserveAttributes="mv:*" type="twoObj" preserve="1">
   <p:cSld name="Two Content">
     <p:spTree>
       <p:nvGrpSpPr>
@@ -2569,7 +2766,7 @@
 </file>
 
 <file path=ppt/slideLayouts/slideLayout5.xml><?xml version="1.0" encoding="utf-8"?>
-<p:sldLayout xmlns:a="http://schemas.openxmlformats.org/drawingml/2006/main" xmlns:r="http://schemas.openxmlformats.org/officeDocument/2006/relationships" xmlns:p="http://schemas.openxmlformats.org/presentationml/2006/main" type="twoTxTwoObj" preserve="1">
+<p:sldLayout xmlns:a="http://schemas.openxmlformats.org/drawingml/2006/main" xmlns:r="http://schemas.openxmlformats.org/officeDocument/2006/relationships" xmlns:mc="http://schemas.openxmlformats.org/markup-compatibility/2006" xmlns:mv="urn:schemas-microsoft-com:mac:vml" xmlns:p="http://schemas.openxmlformats.org/presentationml/2006/main" mc:Ignorable="mv" mc:PreserveAttributes="mv:*" type="twoTxTwoObj" preserve="1">
   <p:cSld name="Comparison">
     <p:spTree>
       <p:nvGrpSpPr>
@@ -2956,7 +3153,7 @@
 </file>
 
 <file path=ppt/slideLayouts/slideLayout6.xml><?xml version="1.0" encoding="utf-8"?>
-<p:sldLayout xmlns:a="http://schemas.openxmlformats.org/drawingml/2006/main" xmlns:r="http://schemas.openxmlformats.org/officeDocument/2006/relationships" xmlns:p="http://schemas.openxmlformats.org/presentationml/2006/main" type="titleOnly" preserve="1">
+<p:sldLayout xmlns:a="http://schemas.openxmlformats.org/drawingml/2006/main" xmlns:r="http://schemas.openxmlformats.org/officeDocument/2006/relationships" xmlns:mc="http://schemas.openxmlformats.org/markup-compatibility/2006" xmlns:mv="urn:schemas-microsoft-com:mac:vml" xmlns:p="http://schemas.openxmlformats.org/presentationml/2006/main" mc:Ignorable="mv" mc:PreserveAttributes="mv:*" type="titleOnly" preserve="1">
   <p:cSld name="Title Only">
     <p:spTree>
       <p:nvGrpSpPr>
@@ -3034,7 +3231,7 @@
 </file>
 
 <file path=ppt/slideLayouts/slideLayout7.xml><?xml version="1.0" encoding="utf-8"?>
-<p:sldLayout xmlns:a="http://schemas.openxmlformats.org/drawingml/2006/main" xmlns:r="http://schemas.openxmlformats.org/officeDocument/2006/relationships" xmlns:p="http://schemas.openxmlformats.org/presentationml/2006/main" type="blank" preserve="1">
+<p:sldLayout xmlns:a="http://schemas.openxmlformats.org/drawingml/2006/main" xmlns:r="http://schemas.openxmlformats.org/officeDocument/2006/relationships" xmlns:mc="http://schemas.openxmlformats.org/markup-compatibility/2006" xmlns:mv="urn:schemas-microsoft-com:mac:vml" xmlns:p="http://schemas.openxmlformats.org/presentationml/2006/main" mc:Ignorable="mv" mc:PreserveAttributes="mv:*" type="blank" preserve="1">
   <p:cSld name="Blank">
     <p:spTree>
       <p:nvGrpSpPr>
@@ -3089,7 +3286,7 @@
 </file>
 
 <file path=ppt/slideLayouts/slideLayout8.xml><?xml version="1.0" encoding="utf-8"?>
-<p:sldLayout xmlns:a="http://schemas.openxmlformats.org/drawingml/2006/main" xmlns:r="http://schemas.openxmlformats.org/officeDocument/2006/relationships" xmlns:p="http://schemas.openxmlformats.org/presentationml/2006/main" type="objTx" preserve="1">
+<p:sldLayout xmlns:a="http://schemas.openxmlformats.org/drawingml/2006/main" xmlns:r="http://schemas.openxmlformats.org/officeDocument/2006/relationships" xmlns:mc="http://schemas.openxmlformats.org/markup-compatibility/2006" xmlns:mv="urn:schemas-microsoft-com:mac:vml" xmlns:p="http://schemas.openxmlformats.org/presentationml/2006/main" mc:Ignorable="mv" mc:PreserveAttributes="mv:*" type="objTx" preserve="1">
   <p:cSld name="Content with Caption">
     <p:spTree>
       <p:nvGrpSpPr>
@@ -3326,7 +3523,7 @@
 </file>
 
 <file path=ppt/slideLayouts/slideLayout9.xml><?xml version="1.0" encoding="utf-8"?>
-<p:sldLayout xmlns:a="http://schemas.openxmlformats.org/drawingml/2006/main" xmlns:r="http://schemas.openxmlformats.org/officeDocument/2006/relationships" xmlns:p="http://schemas.openxmlformats.org/presentationml/2006/main" type="picTx" preserve="1">
+<p:sldLayout xmlns:a="http://schemas.openxmlformats.org/drawingml/2006/main" xmlns:r="http://schemas.openxmlformats.org/officeDocument/2006/relationships" xmlns:mc="http://schemas.openxmlformats.org/markup-compatibility/2006" xmlns:mv="urn:schemas-microsoft-com:mac:vml" xmlns:p="http://schemas.openxmlformats.org/presentationml/2006/main" mc:Ignorable="mv" mc:PreserveAttributes="mv:*" type="picTx" preserve="1">
   <p:cSld name="Picture with Caption">
     <p:spTree>
       <p:nvGrpSpPr>
@@ -3540,7 +3737,7 @@
 </file>
 
 <file path=ppt/slideMasters/slideMaster1.xml><?xml version="1.0" encoding="utf-8"?>
-<p:sldMaster xmlns:a="http://schemas.openxmlformats.org/drawingml/2006/main" xmlns:r="http://schemas.openxmlformats.org/officeDocument/2006/relationships" xmlns:p="http://schemas.openxmlformats.org/presentationml/2006/main">
+<p:sldMaster xmlns:a="http://schemas.openxmlformats.org/drawingml/2006/main" xmlns:r="http://schemas.openxmlformats.org/officeDocument/2006/relationships" xmlns:mc="http://schemas.openxmlformats.org/markup-compatibility/2006" xmlns:mv="urn:schemas-microsoft-com:mac:vml" xmlns:p="http://schemas.openxmlformats.org/presentationml/2006/main" mc:Ignorable="mv" mc:PreserveAttributes="mv:*">
   <p:cSld>
     <p:bg>
       <p:bgPr>
@@ -4195,7 +4392,7 @@
 </file>
 
 <file path=ppt/slideMasters/slideMaster10.xml><?xml version="1.0" encoding="utf-8"?>
-<p:sldMaster xmlns:a="http://schemas.openxmlformats.org/drawingml/2006/main" xmlns:r="http://schemas.openxmlformats.org/officeDocument/2006/relationships" xmlns:p="http://schemas.openxmlformats.org/presentationml/2006/main" preserve="1">
+<p:sldMaster xmlns:a="http://schemas.openxmlformats.org/drawingml/2006/main" xmlns:r="http://schemas.openxmlformats.org/officeDocument/2006/relationships" xmlns:mc="http://schemas.openxmlformats.org/markup-compatibility/2006" xmlns:mv="urn:schemas-microsoft-com:mac:vml" xmlns:p="http://schemas.openxmlformats.org/presentationml/2006/main" mc:Ignorable="mv" mc:PreserveAttributes="mv:*" preserve="1">
   <p:cSld>
     <p:bg>
       <p:bgRef idx="1001">
@@ -4800,7 +4997,7 @@
 </file>
 
 <file path=ppt/slideMasters/slideMaster11.xml><?xml version="1.0" encoding="utf-8"?>
-<p:sldMaster xmlns:a="http://schemas.openxmlformats.org/drawingml/2006/main" xmlns:r="http://schemas.openxmlformats.org/officeDocument/2006/relationships" xmlns:p="http://schemas.openxmlformats.org/presentationml/2006/main" preserve="1">
+<p:sldMaster xmlns:a="http://schemas.openxmlformats.org/drawingml/2006/main" xmlns:r="http://schemas.openxmlformats.org/officeDocument/2006/relationships" xmlns:mc="http://schemas.openxmlformats.org/markup-compatibility/2006" xmlns:mv="urn:schemas-microsoft-com:mac:vml" xmlns:p="http://schemas.openxmlformats.org/presentationml/2006/main" mc:Ignorable="mv" mc:PreserveAttributes="mv:*" preserve="1">
   <p:cSld>
     <p:bg>
       <p:bgPr>
@@ -5048,7 +5245,7 @@
     </p:spTree>
   </p:cSld>
   <p:clrMap bg1="lt1" tx1="dk1" bg2="lt2" tx2="dk2" accent1="accent1" accent2="accent2" accent3="accent3" accent4="accent4" accent5="accent5" accent6="accent6" hlink="hlink" folHlink="folHlink"/>
-  <p:transition xmlns:p14="http://schemas.microsoft.com/office/powerpoint/2010/main" spd="med">
+  <p:transition spd="med">
     <p:fade/>
   </p:transition>
   <p:hf hdr="0"/>
@@ -5465,7 +5662,7 @@
 </file>
 
 <file path=ppt/slideMasters/slideMaster12.xml><?xml version="1.0" encoding="utf-8"?>
-<p:sldMaster xmlns:a="http://schemas.openxmlformats.org/drawingml/2006/main" xmlns:r="http://schemas.openxmlformats.org/officeDocument/2006/relationships" xmlns:p="http://schemas.openxmlformats.org/presentationml/2006/main">
+<p:sldMaster xmlns:a="http://schemas.openxmlformats.org/drawingml/2006/main" xmlns:r="http://schemas.openxmlformats.org/officeDocument/2006/relationships" xmlns:mc="http://schemas.openxmlformats.org/markup-compatibility/2006" xmlns:mv="urn:schemas-microsoft-com:mac:vml" xmlns:p="http://schemas.openxmlformats.org/presentationml/2006/main" mc:Ignorable="mv" mc:PreserveAttributes="mv:*">
   <p:cSld>
     <p:bg>
       <p:bgRef idx="1001">
@@ -5638,7 +5835,7 @@
             <a:fld id="{96999AEB-98EF-46F6-BBE8-DCF260C9F80F}" type="datetime1">
               <a:rPr lang="en-US"/>
               <a:pPr/>
-              <a:t>3/4/13</a:t>
+              <a:t>3/6/13</a:t>
             </a:fld>
             <a:endParaRPr lang="en-US"/>
           </a:p>
@@ -6287,7 +6484,7 @@
 </file>
 
 <file path=ppt/slideMasters/slideMaster2.xml><?xml version="1.0" encoding="utf-8"?>
-<p:sldMaster xmlns:a="http://schemas.openxmlformats.org/drawingml/2006/main" xmlns:r="http://schemas.openxmlformats.org/officeDocument/2006/relationships" xmlns:p="http://schemas.openxmlformats.org/presentationml/2006/main" preserve="1">
+<p:sldMaster xmlns:a="http://schemas.openxmlformats.org/drawingml/2006/main" xmlns:r="http://schemas.openxmlformats.org/officeDocument/2006/relationships" xmlns:mc="http://schemas.openxmlformats.org/markup-compatibility/2006" xmlns:mv="urn:schemas-microsoft-com:mac:vml" xmlns:p="http://schemas.openxmlformats.org/presentationml/2006/main" mc:Ignorable="mv" mc:PreserveAttributes="mv:*" preserve="1">
   <p:cSld>
     <p:bg>
       <p:bgRef idx="1001">
@@ -6892,7 +7089,7 @@
 </file>
 
 <file path=ppt/slideMasters/slideMaster3.xml><?xml version="1.0" encoding="utf-8"?>
-<p:sldMaster xmlns:a="http://schemas.openxmlformats.org/drawingml/2006/main" xmlns:r="http://schemas.openxmlformats.org/officeDocument/2006/relationships" xmlns:p="http://schemas.openxmlformats.org/presentationml/2006/main" preserve="1">
+<p:sldMaster xmlns:a="http://schemas.openxmlformats.org/drawingml/2006/main" xmlns:r="http://schemas.openxmlformats.org/officeDocument/2006/relationships" xmlns:mc="http://schemas.openxmlformats.org/markup-compatibility/2006" xmlns:mv="urn:schemas-microsoft-com:mac:vml" xmlns:p="http://schemas.openxmlformats.org/presentationml/2006/main" mc:Ignorable="mv" mc:PreserveAttributes="mv:*" preserve="1">
   <p:cSld>
     <p:bg>
       <p:bgPr>
@@ -7270,7 +7467,7 @@
   <p:timing>
     <p:tnLst>
       <p:par>
-        <p:cTn xmlns:p14="http://schemas.microsoft.com/office/powerpoint/2010/main" id="1" dur="indefinite" restart="never" nodeType="tmRoot"/>
+        <p:cTn id="1" dur="indefinite" restart="never" nodeType="tmRoot"/>
       </p:par>
     </p:tnLst>
   </p:timing>
@@ -7683,7 +7880,7 @@
 </file>
 
 <file path=ppt/slideMasters/slideMaster4.xml><?xml version="1.0" encoding="utf-8"?>
-<p:sldMaster xmlns:a="http://schemas.openxmlformats.org/drawingml/2006/main" xmlns:r="http://schemas.openxmlformats.org/officeDocument/2006/relationships" xmlns:p="http://schemas.openxmlformats.org/presentationml/2006/main" preserve="1">
+<p:sldMaster xmlns:a="http://schemas.openxmlformats.org/drawingml/2006/main" xmlns:r="http://schemas.openxmlformats.org/officeDocument/2006/relationships" xmlns:mc="http://schemas.openxmlformats.org/markup-compatibility/2006" xmlns:mv="urn:schemas-microsoft-com:mac:vml" xmlns:p="http://schemas.openxmlformats.org/presentationml/2006/main" mc:Ignorable="mv" mc:PreserveAttributes="mv:*" preserve="1">
   <p:cSld>
     <p:bg>
       <p:bgPr>
@@ -8061,7 +8258,7 @@
   <p:timing>
     <p:tnLst>
       <p:par>
-        <p:cTn xmlns:p14="http://schemas.microsoft.com/office/powerpoint/2010/main" id="1" dur="indefinite" restart="never" nodeType="tmRoot"/>
+        <p:cTn id="1" dur="indefinite" restart="never" nodeType="tmRoot"/>
       </p:par>
     </p:tnLst>
   </p:timing>
@@ -8474,7 +8671,7 @@
 </file>
 
 <file path=ppt/slideMasters/slideMaster5.xml><?xml version="1.0" encoding="utf-8"?>
-<p:sldMaster xmlns:a="http://schemas.openxmlformats.org/drawingml/2006/main" xmlns:r="http://schemas.openxmlformats.org/officeDocument/2006/relationships" xmlns:p="http://schemas.openxmlformats.org/presentationml/2006/main" preserve="1">
+<p:sldMaster xmlns:a="http://schemas.openxmlformats.org/drawingml/2006/main" xmlns:r="http://schemas.openxmlformats.org/officeDocument/2006/relationships" xmlns:mc="http://schemas.openxmlformats.org/markup-compatibility/2006" xmlns:mv="urn:schemas-microsoft-com:mac:vml" xmlns:p="http://schemas.openxmlformats.org/presentationml/2006/main" mc:Ignorable="mv" mc:PreserveAttributes="mv:*" preserve="1">
   <p:cSld>
     <p:bg>
       <p:bgRef idx="1001">
@@ -9079,7 +9276,7 @@
 </file>
 
 <file path=ppt/slideMasters/slideMaster6.xml><?xml version="1.0" encoding="utf-8"?>
-<p:sldMaster xmlns:a="http://schemas.openxmlformats.org/drawingml/2006/main" xmlns:r="http://schemas.openxmlformats.org/officeDocument/2006/relationships" xmlns:p="http://schemas.openxmlformats.org/presentationml/2006/main" preserve="1">
+<p:sldMaster xmlns:a="http://schemas.openxmlformats.org/drawingml/2006/main" xmlns:r="http://schemas.openxmlformats.org/officeDocument/2006/relationships" xmlns:mc="http://schemas.openxmlformats.org/markup-compatibility/2006" xmlns:mv="urn:schemas-microsoft-com:mac:vml" xmlns:p="http://schemas.openxmlformats.org/presentationml/2006/main" mc:Ignorable="mv" mc:PreserveAttributes="mv:*" preserve="1">
   <p:cSld>
     <p:bg>
       <p:bgPr>
@@ -9457,7 +9654,7 @@
   <p:timing>
     <p:tnLst>
       <p:par>
-        <p:cTn xmlns:p14="http://schemas.microsoft.com/office/powerpoint/2010/main" id="1" dur="indefinite" restart="never" nodeType="tmRoot"/>
+        <p:cTn id="1" dur="indefinite" restart="never" nodeType="tmRoot"/>
       </p:par>
     </p:tnLst>
   </p:timing>
@@ -9870,7 +10067,7 @@
 </file>
 
 <file path=ppt/slideMasters/slideMaster7.xml><?xml version="1.0" encoding="utf-8"?>
-<p:sldMaster xmlns:a="http://schemas.openxmlformats.org/drawingml/2006/main" xmlns:r="http://schemas.openxmlformats.org/officeDocument/2006/relationships" xmlns:p="http://schemas.openxmlformats.org/presentationml/2006/main" preserve="1">
+<p:sldMaster xmlns:a="http://schemas.openxmlformats.org/drawingml/2006/main" xmlns:r="http://schemas.openxmlformats.org/officeDocument/2006/relationships" xmlns:mc="http://schemas.openxmlformats.org/markup-compatibility/2006" xmlns:mv="urn:schemas-microsoft-com:mac:vml" xmlns:p="http://schemas.openxmlformats.org/presentationml/2006/main" mc:Ignorable="mv" mc:PreserveAttributes="mv:*" preserve="1">
   <p:cSld>
     <p:bg>
       <p:bgRef idx="1001">
@@ -10475,7 +10672,7 @@
 </file>
 
 <file path=ppt/slideMasters/slideMaster8.xml><?xml version="1.0" encoding="utf-8"?>
-<p:sldMaster xmlns:a="http://schemas.openxmlformats.org/drawingml/2006/main" xmlns:r="http://schemas.openxmlformats.org/officeDocument/2006/relationships" xmlns:p="http://schemas.openxmlformats.org/presentationml/2006/main">
+<p:sldMaster xmlns:a="http://schemas.openxmlformats.org/drawingml/2006/main" xmlns:r="http://schemas.openxmlformats.org/officeDocument/2006/relationships" xmlns:mc="http://schemas.openxmlformats.org/markup-compatibility/2006" xmlns:mv="urn:schemas-microsoft-com:mac:vml" xmlns:p="http://schemas.openxmlformats.org/presentationml/2006/main" mc:Ignorable="mv" mc:PreserveAttributes="mv:*">
   <p:cSld>
     <p:bg>
       <p:bgRef idx="1001">
@@ -10648,7 +10845,7 @@
             <a:fld id="{B6390B92-557F-46B2-93F4-CCC7D45FA683}" type="datetime1">
               <a:rPr lang="en-US"/>
               <a:pPr/>
-              <a:t>3/4/13</a:t>
+              <a:t>3/6/13</a:t>
             </a:fld>
             <a:endParaRPr lang="en-US"/>
           </a:p>
@@ -11297,7 +11494,7 @@
 </file>
 
 <file path=ppt/slideMasters/slideMaster9.xml><?xml version="1.0" encoding="utf-8"?>
-<p:sldMaster xmlns:a="http://schemas.openxmlformats.org/drawingml/2006/main" xmlns:r="http://schemas.openxmlformats.org/officeDocument/2006/relationships" xmlns:p="http://schemas.openxmlformats.org/presentationml/2006/main" preserve="1">
+<p:sldMaster xmlns:a="http://schemas.openxmlformats.org/drawingml/2006/main" xmlns:r="http://schemas.openxmlformats.org/officeDocument/2006/relationships" xmlns:mc="http://schemas.openxmlformats.org/markup-compatibility/2006" xmlns:mv="urn:schemas-microsoft-com:mac:vml" xmlns:p="http://schemas.openxmlformats.org/presentationml/2006/main" mc:Ignorable="mv" mc:PreserveAttributes="mv:*" preserve="1">
   <p:cSld>
     <p:bg>
       <p:bgPr>
@@ -11545,7 +11742,7 @@
     </p:spTree>
   </p:cSld>
   <p:clrMap bg1="lt1" tx1="dk1" bg2="lt2" tx2="dk2" accent1="accent1" accent2="accent2" accent3="accent3" accent4="accent4" accent5="accent5" accent6="accent6" hlink="hlink" folHlink="folHlink"/>
-  <p:transition xmlns:p14="http://schemas.microsoft.com/office/powerpoint/2010/main" spd="med">
+  <p:transition spd="med">
     <p:fade/>
   </p:transition>
   <p:hf hdr="0"/>
@@ -11962,7 +12159,7 @@
 </file>
 
 <file path=ppt/slides/slide1.xml><?xml version="1.0" encoding="utf-8"?>
-<p:sld xmlns:a="http://schemas.openxmlformats.org/drawingml/2006/main" xmlns:r="http://schemas.openxmlformats.org/officeDocument/2006/relationships" xmlns:p="http://schemas.openxmlformats.org/presentationml/2006/main">
+<p:sld xmlns:a="http://schemas.openxmlformats.org/drawingml/2006/main" xmlns:r="http://schemas.openxmlformats.org/officeDocument/2006/relationships" xmlns:mc="http://schemas.openxmlformats.org/markup-compatibility/2006" xmlns:mv="urn:schemas-microsoft-com:mac:vml" xmlns:p="http://schemas.openxmlformats.org/presentationml/2006/main" mc:Ignorable="mv" mc:PreserveAttributes="mv:*">
   <p:cSld>
     <p:spTree>
       <p:nvGrpSpPr>
@@ -12044,17 +12241,8 @@
               <a:rPr lang="en-US" dirty="0" smtClean="0">
                 <a:ea typeface="ＭＳ Ｐゴシック" pitchFamily="34" charset="-128"/>
               </a:rPr>
-              <a:t>Presented by: </a:t>
-            </a:r>
-            <a:r>
-              <a:rPr lang="en-US" dirty="0" smtClean="0">
-                <a:ea typeface="ＭＳ Ｐゴシック" pitchFamily="34" charset="-128"/>
-              </a:rPr>
-              <a:t>Melissa Romanus</a:t>
-            </a:r>
-            <a:endParaRPr lang="en-US" dirty="0" smtClean="0">
-              <a:ea typeface="ＭＳ Ｐゴシック" pitchFamily="34" charset="-128"/>
-            </a:endParaRPr>
+              <a:t>Presented by: Melissa Romanus</a:t>
+            </a:r>
           </a:p>
           <a:p>
             <a:pPr eaLnBrk="1" hangingPunct="1"/>
@@ -12103,7 +12291,7 @@
   <p:timing>
     <p:tnLst>
       <p:par>
-        <p:cTn xmlns:p14="http://schemas.microsoft.com/office/powerpoint/2010/main" id="1" dur="indefinite" restart="never" nodeType="tmRoot"/>
+        <p:cTn id="1" dur="indefinite" restart="never" nodeType="tmRoot"/>
       </p:par>
     </p:tnLst>
   </p:timing>
@@ -12111,7 +12299,7 @@
 </file>
 
 <file path=ppt/slides/slide10.xml><?xml version="1.0" encoding="utf-8"?>
-<p:sld xmlns:a="http://schemas.openxmlformats.org/drawingml/2006/main" xmlns:r="http://schemas.openxmlformats.org/officeDocument/2006/relationships" xmlns:p="http://schemas.openxmlformats.org/presentationml/2006/main">
+<p:sld xmlns:a="http://schemas.openxmlformats.org/drawingml/2006/main" xmlns:r="http://schemas.openxmlformats.org/officeDocument/2006/relationships" xmlns:mc="http://schemas.openxmlformats.org/markup-compatibility/2006" xmlns:mv="urn:schemas-microsoft-com:mac:vml" xmlns:p="http://schemas.openxmlformats.org/presentationml/2006/main" mc:Ignorable="mv" mc:PreserveAttributes="mv:*">
   <p:cSld>
     <p:spTree>
       <p:nvGrpSpPr>
@@ -12313,18 +12501,18 @@
     </p:spTree>
     <p:extLst>
       <p:ext uri="{BB962C8B-B14F-4D97-AF65-F5344CB8AC3E}">
-        <p14:creationId xmlns:p14="http://schemas.microsoft.com/office/powerpoint/2010/main" val="3930915092"/>
+        <p14:creationId xmlns:p14="http://schemas.microsoft.com/office/powerpoint/2010/main" xmlns:p="http://schemas.openxmlformats.org/presentationml/2006/main" xmlns:r="http://schemas.openxmlformats.org/officeDocument/2006/relationships" xmlns:a="http://schemas.openxmlformats.org/drawingml/2006/main" xmlns="" val="3930915092"/>
       </p:ext>
     </p:extLst>
   </p:cSld>
   <p:clrMapOvr>
     <a:masterClrMapping/>
   </p:clrMapOvr>
-  <p:transition xmlns:p14="http://schemas.microsoft.com/office/powerpoint/2010/main"/>
+  <p:transition/>
   <p:timing>
     <p:tnLst>
       <p:par>
-        <p:cTn xmlns:p14="http://schemas.microsoft.com/office/powerpoint/2010/main" id="1" dur="indefinite" restart="never" nodeType="tmRoot"/>
+        <p:cTn id="1" dur="indefinite" restart="never" nodeType="tmRoot"/>
       </p:par>
     </p:tnLst>
   </p:timing>
@@ -12332,7 +12520,7 @@
 </file>
 
 <file path=ppt/slides/slide11.xml><?xml version="1.0" encoding="utf-8"?>
-<p:sld xmlns:a="http://schemas.openxmlformats.org/drawingml/2006/main" xmlns:r="http://schemas.openxmlformats.org/officeDocument/2006/relationships" xmlns:p="http://schemas.openxmlformats.org/presentationml/2006/main">
+<p:sld xmlns:a="http://schemas.openxmlformats.org/drawingml/2006/main" xmlns:r="http://schemas.openxmlformats.org/officeDocument/2006/relationships" xmlns:mc="http://schemas.openxmlformats.org/markup-compatibility/2006" xmlns:mv="urn:schemas-microsoft-com:mac:vml" xmlns:p="http://schemas.openxmlformats.org/presentationml/2006/main" mc:Ignorable="mv" mc:PreserveAttributes="mv:*">
   <p:cSld>
     <p:spTree>
       <p:nvGrpSpPr>
@@ -13189,18 +13377,18 @@
     </p:spTree>
     <p:extLst>
       <p:ext uri="{BB962C8B-B14F-4D97-AF65-F5344CB8AC3E}">
-        <p14:creationId xmlns:p14="http://schemas.microsoft.com/office/powerpoint/2010/main" val="2385870330"/>
+        <p14:creationId xmlns:p14="http://schemas.microsoft.com/office/powerpoint/2010/main" xmlns:p="http://schemas.openxmlformats.org/presentationml/2006/main" xmlns:r="http://schemas.openxmlformats.org/officeDocument/2006/relationships" xmlns:a="http://schemas.openxmlformats.org/drawingml/2006/main" xmlns="" val="2385870330"/>
       </p:ext>
     </p:extLst>
   </p:cSld>
   <p:clrMapOvr>
     <a:masterClrMapping/>
   </p:clrMapOvr>
-  <p:transition xmlns:p14="http://schemas.microsoft.com/office/powerpoint/2010/main"/>
+  <p:transition/>
   <p:timing>
     <p:tnLst>
       <p:par>
-        <p:cTn xmlns:p14="http://schemas.microsoft.com/office/powerpoint/2010/main" id="1" dur="indefinite" restart="never" nodeType="tmRoot"/>
+        <p:cTn id="1" dur="indefinite" restart="never" nodeType="tmRoot"/>
       </p:par>
     </p:tnLst>
   </p:timing>
@@ -13208,7 +13396,7 @@
 </file>
 
 <file path=ppt/slides/slide12.xml><?xml version="1.0" encoding="utf-8"?>
-<p:sld xmlns:a="http://schemas.openxmlformats.org/drawingml/2006/main" xmlns:r="http://schemas.openxmlformats.org/officeDocument/2006/relationships" xmlns:p="http://schemas.openxmlformats.org/presentationml/2006/main">
+<p:sld xmlns:a="http://schemas.openxmlformats.org/drawingml/2006/main" xmlns:r="http://schemas.openxmlformats.org/officeDocument/2006/relationships" xmlns:mc="http://schemas.openxmlformats.org/markup-compatibility/2006" xmlns:mv="urn:schemas-microsoft-com:mac:vml" xmlns:p="http://schemas.openxmlformats.org/presentationml/2006/main" mc:Ignorable="mv" mc:PreserveAttributes="mv:*">
   <p:cSld>
     <p:spTree>
       <p:nvGrpSpPr>
@@ -13874,18 +14062,18 @@
     </p:spTree>
     <p:extLst>
       <p:ext uri="{BB962C8B-B14F-4D97-AF65-F5344CB8AC3E}">
-        <p14:creationId xmlns:p14="http://schemas.microsoft.com/office/powerpoint/2010/main" val="143289954"/>
+        <p14:creationId xmlns:p14="http://schemas.microsoft.com/office/powerpoint/2010/main" xmlns:p="http://schemas.openxmlformats.org/presentationml/2006/main" xmlns:r="http://schemas.openxmlformats.org/officeDocument/2006/relationships" xmlns:a="http://schemas.openxmlformats.org/drawingml/2006/main" xmlns="" val="143289954"/>
       </p:ext>
     </p:extLst>
   </p:cSld>
   <p:clrMapOvr>
     <a:masterClrMapping/>
   </p:clrMapOvr>
-  <p:transition xmlns:p14="http://schemas.microsoft.com/office/powerpoint/2010/main"/>
+  <p:transition/>
   <p:timing>
     <p:tnLst>
       <p:par>
-        <p:cTn xmlns:p14="http://schemas.microsoft.com/office/powerpoint/2010/main" id="1" dur="indefinite" restart="never" nodeType="tmRoot"/>
+        <p:cTn id="1" dur="indefinite" restart="never" nodeType="tmRoot"/>
       </p:par>
     </p:tnLst>
   </p:timing>
@@ -13893,7 +14081,7 @@
 </file>
 
 <file path=ppt/slides/slide13.xml><?xml version="1.0" encoding="utf-8"?>
-<p:sld xmlns:a="http://schemas.openxmlformats.org/drawingml/2006/main" xmlns:r="http://schemas.openxmlformats.org/officeDocument/2006/relationships" xmlns:p="http://schemas.openxmlformats.org/presentationml/2006/main">
+<p:sld xmlns:a="http://schemas.openxmlformats.org/drawingml/2006/main" xmlns:r="http://schemas.openxmlformats.org/officeDocument/2006/relationships" xmlns:mc="http://schemas.openxmlformats.org/markup-compatibility/2006" xmlns:mv="urn:schemas-microsoft-com:mac:vml" xmlns:p="http://schemas.openxmlformats.org/presentationml/2006/main" mc:Ignorable="mv" mc:PreserveAttributes="mv:*">
   <p:cSld>
     <p:spTree>
       <p:nvGrpSpPr>
@@ -13970,11 +14158,7 @@
             </a:pPr>
             <a:r>
               <a:rPr lang="en-US" b="1" dirty="0" smtClean="0"/>
-              <a:t>Chained Example</a:t>
-            </a:r>
-            <a:r>
-              <a:rPr lang="en-US" b="1" dirty="0" smtClean="0"/>
-              <a:t>: </a:t>
+              <a:t>Chained Example: </a:t>
             </a:r>
             <a:r>
               <a:rPr lang="en-US" b="1" dirty="0" err="1" smtClean="0"/>
@@ -14288,18 +14472,18 @@
     </p:spTree>
     <p:extLst>
       <p:ext uri="{BB962C8B-B14F-4D97-AF65-F5344CB8AC3E}">
-        <p14:creationId xmlns:p14="http://schemas.microsoft.com/office/powerpoint/2010/main" val="3453571518"/>
+        <p14:creationId xmlns:p14="http://schemas.microsoft.com/office/powerpoint/2010/main" xmlns:p="http://schemas.openxmlformats.org/presentationml/2006/main" xmlns:r="http://schemas.openxmlformats.org/officeDocument/2006/relationships" xmlns:a="http://schemas.openxmlformats.org/drawingml/2006/main" xmlns="" val="3453571518"/>
       </p:ext>
     </p:extLst>
   </p:cSld>
   <p:clrMapOvr>
     <a:masterClrMapping/>
   </p:clrMapOvr>
-  <p:transition xmlns:p14="http://schemas.microsoft.com/office/powerpoint/2010/main"/>
+  <p:transition/>
   <p:timing>
     <p:tnLst>
       <p:par>
-        <p:cTn xmlns:p14="http://schemas.microsoft.com/office/powerpoint/2010/main" id="1" dur="indefinite" restart="never" nodeType="tmRoot"/>
+        <p:cTn id="1" dur="indefinite" restart="never" nodeType="tmRoot"/>
       </p:par>
     </p:tnLst>
   </p:timing>
@@ -14307,7 +14491,7 @@
 </file>
 
 <file path=ppt/slides/slide14.xml><?xml version="1.0" encoding="utf-8"?>
-<p:sld xmlns:a="http://schemas.openxmlformats.org/drawingml/2006/main" xmlns:r="http://schemas.openxmlformats.org/officeDocument/2006/relationships" xmlns:p="http://schemas.openxmlformats.org/presentationml/2006/main">
+<p:sld xmlns:a="http://schemas.openxmlformats.org/drawingml/2006/main" xmlns:r="http://schemas.openxmlformats.org/officeDocument/2006/relationships" xmlns:mc="http://schemas.openxmlformats.org/markup-compatibility/2006" xmlns:mv="urn:schemas-microsoft-com:mac:vml" xmlns:p="http://schemas.openxmlformats.org/presentationml/2006/main" mc:Ignorable="mv" mc:PreserveAttributes="mv:*">
   <p:cSld>
     <p:spTree>
       <p:nvGrpSpPr>
@@ -14384,11 +14568,7 @@
             </a:pPr>
             <a:r>
               <a:rPr lang="en-US" b="1" dirty="0" smtClean="0"/>
-              <a:t>Coupled Example</a:t>
-            </a:r>
-            <a:r>
-              <a:rPr lang="en-US" b="1" dirty="0" smtClean="0"/>
-              <a:t>: </a:t>
+              <a:t>Coupled Example: </a:t>
             </a:r>
             <a:r>
               <a:rPr lang="en-US" b="1" dirty="0" err="1" smtClean="0"/>
@@ -14702,18 +14882,18 @@
     </p:spTree>
     <p:extLst>
       <p:ext uri="{BB962C8B-B14F-4D97-AF65-F5344CB8AC3E}">
-        <p14:creationId xmlns:p14="http://schemas.microsoft.com/office/powerpoint/2010/main" val="2852088678"/>
+        <p14:creationId xmlns:p14="http://schemas.microsoft.com/office/powerpoint/2010/main" xmlns:p="http://schemas.openxmlformats.org/presentationml/2006/main" xmlns:r="http://schemas.openxmlformats.org/officeDocument/2006/relationships" xmlns:a="http://schemas.openxmlformats.org/drawingml/2006/main" xmlns="" val="2852088678"/>
       </p:ext>
     </p:extLst>
   </p:cSld>
   <p:clrMapOvr>
     <a:masterClrMapping/>
   </p:clrMapOvr>
-  <p:transition xmlns:p14="http://schemas.microsoft.com/office/powerpoint/2010/main"/>
+  <p:transition/>
   <p:timing>
     <p:tnLst>
       <p:par>
-        <p:cTn xmlns:p14="http://schemas.microsoft.com/office/powerpoint/2010/main" id="1" dur="indefinite" restart="never" nodeType="tmRoot"/>
+        <p:cTn id="1" dur="indefinite" restart="never" nodeType="tmRoot"/>
       </p:par>
     </p:tnLst>
   </p:timing>
@@ -14721,7 +14901,7 @@
 </file>
 
 <file path=ppt/slides/slide15.xml><?xml version="1.0" encoding="utf-8"?>
-<p:sld xmlns:a="http://schemas.openxmlformats.org/drawingml/2006/main" xmlns:r="http://schemas.openxmlformats.org/officeDocument/2006/relationships" xmlns:p="http://schemas.openxmlformats.org/presentationml/2006/main">
+<p:sld xmlns:a="http://schemas.openxmlformats.org/drawingml/2006/main" xmlns:r="http://schemas.openxmlformats.org/officeDocument/2006/relationships" xmlns:mc="http://schemas.openxmlformats.org/markup-compatibility/2006" xmlns:mv="urn:schemas-microsoft-com:mac:vml" xmlns:p="http://schemas.openxmlformats.org/presentationml/2006/main" mc:Ignorable="mv" mc:PreserveAttributes="mv:*">
   <p:cSld>
     <p:spTree>
       <p:nvGrpSpPr>
@@ -14758,9 +14938,6 @@
               </a:rPr>
               <a:t>Sample: Running on Stampede</a:t>
             </a:r>
-            <a:endParaRPr lang="en-US" sz="2800" dirty="0" smtClean="0">
-              <a:ea typeface="ＭＳ Ｐゴシック" pitchFamily="34" charset="-128"/>
-            </a:endParaRPr>
           </a:p>
         </p:txBody>
       </p:sp>
@@ -14801,11 +14978,7 @@
             </a:pPr>
             <a:r>
               <a:rPr lang="en-US" b="1" dirty="0" smtClean="0"/>
-              <a:t>Coupled Example</a:t>
-            </a:r>
-            <a:r>
-              <a:rPr lang="en-US" b="1" dirty="0" smtClean="0"/>
-              <a:t>: </a:t>
+              <a:t>Coupled Example: </a:t>
             </a:r>
             <a:r>
               <a:rPr lang="en-US" b="1" dirty="0" err="1" smtClean="0"/>
@@ -15119,18 +15292,18 @@
     </p:spTree>
     <p:extLst>
       <p:ext uri="{BB962C8B-B14F-4D97-AF65-F5344CB8AC3E}">
-        <p14:creationId xmlns:p14="http://schemas.microsoft.com/office/powerpoint/2010/main" val="3661449385"/>
+        <p14:creationId xmlns:p14="http://schemas.microsoft.com/office/powerpoint/2010/main" xmlns:p="http://schemas.openxmlformats.org/presentationml/2006/main" xmlns:r="http://schemas.openxmlformats.org/officeDocument/2006/relationships" xmlns:a="http://schemas.openxmlformats.org/drawingml/2006/main" xmlns="" val="3661449385"/>
       </p:ext>
     </p:extLst>
   </p:cSld>
   <p:clrMapOvr>
     <a:masterClrMapping/>
   </p:clrMapOvr>
-  <p:transition xmlns:p14="http://schemas.microsoft.com/office/powerpoint/2010/main"/>
+  <p:transition/>
   <p:timing>
     <p:tnLst>
       <p:par>
-        <p:cTn xmlns:p14="http://schemas.microsoft.com/office/powerpoint/2010/main" id="1" dur="indefinite" restart="never" nodeType="tmRoot"/>
+        <p:cTn id="1" dur="indefinite" restart="never" nodeType="tmRoot"/>
       </p:par>
     </p:tnLst>
   </p:timing>
@@ -15138,7 +15311,7 @@
 </file>
 
 <file path=ppt/slides/slide16.xml><?xml version="1.0" encoding="utf-8"?>
-<p:sld xmlns:a="http://schemas.openxmlformats.org/drawingml/2006/main" xmlns:r="http://schemas.openxmlformats.org/officeDocument/2006/relationships" xmlns:p="http://schemas.openxmlformats.org/presentationml/2006/main">
+<p:sld xmlns:a="http://schemas.openxmlformats.org/drawingml/2006/main" xmlns:r="http://schemas.openxmlformats.org/officeDocument/2006/relationships" xmlns:mc="http://schemas.openxmlformats.org/markup-compatibility/2006" xmlns:mv="urn:schemas-microsoft-com:mac:vml" xmlns:p="http://schemas.openxmlformats.org/presentationml/2006/main" mc:Ignorable="mv" mc:PreserveAttributes="mv:*">
   <p:cSld>
     <p:spTree>
       <p:nvGrpSpPr>
@@ -15217,7 +15390,6 @@
               <a:rPr lang="en-US" b="1" dirty="0" smtClean="0"/>
               <a:t>Running on Stampede</a:t>
             </a:r>
-            <a:endParaRPr lang="en-US" b="1" dirty="0" smtClean="0"/>
           </a:p>
           <a:p>
             <a:pPr>
@@ -15525,18 +15697,18 @@
     </p:spTree>
     <p:extLst>
       <p:ext uri="{BB962C8B-B14F-4D97-AF65-F5344CB8AC3E}">
-        <p14:creationId xmlns:p14="http://schemas.microsoft.com/office/powerpoint/2010/main" val="3661449385"/>
+        <p14:creationId xmlns:p14="http://schemas.microsoft.com/office/powerpoint/2010/main" xmlns:p="http://schemas.openxmlformats.org/presentationml/2006/main" xmlns:r="http://schemas.openxmlformats.org/officeDocument/2006/relationships" xmlns:a="http://schemas.openxmlformats.org/drawingml/2006/main" xmlns="" val="3661449385"/>
       </p:ext>
     </p:extLst>
   </p:cSld>
   <p:clrMapOvr>
     <a:masterClrMapping/>
   </p:clrMapOvr>
-  <p:transition xmlns:p14="http://schemas.microsoft.com/office/powerpoint/2010/main"/>
+  <p:transition/>
   <p:timing>
     <p:tnLst>
       <p:par>
-        <p:cTn xmlns:p14="http://schemas.microsoft.com/office/powerpoint/2010/main" id="1" dur="indefinite" restart="never" nodeType="tmRoot"/>
+        <p:cTn id="1" dur="indefinite" restart="never" nodeType="tmRoot"/>
       </p:par>
     </p:tnLst>
   </p:timing>
@@ -15544,7 +15716,7 @@
 </file>
 
 <file path=ppt/slides/slide17.xml><?xml version="1.0" encoding="utf-8"?>
-<p:sld xmlns:a="http://schemas.openxmlformats.org/drawingml/2006/main" xmlns:r="http://schemas.openxmlformats.org/officeDocument/2006/relationships" xmlns:p="http://schemas.openxmlformats.org/presentationml/2006/main">
+<p:sld xmlns:a="http://schemas.openxmlformats.org/drawingml/2006/main" xmlns:r="http://schemas.openxmlformats.org/officeDocument/2006/relationships" xmlns:mc="http://schemas.openxmlformats.org/markup-compatibility/2006" xmlns:mv="urn:schemas-microsoft-com:mac:vml" xmlns:p="http://schemas.openxmlformats.org/presentationml/2006/main" mc:Ignorable="mv" mc:PreserveAttributes="mv:*">
   <p:cSld>
     <p:spTree>
       <p:nvGrpSpPr>
@@ -15581,9 +15753,6 @@
               </a:rPr>
               <a:t>Introduction to Pilot Data</a:t>
             </a:r>
-            <a:endParaRPr lang="en-US" sz="2800" dirty="0" smtClean="0">
-              <a:ea typeface="ＭＳ Ｐゴシック" pitchFamily="34" charset="-128"/>
-            </a:endParaRPr>
           </a:p>
         </p:txBody>
       </p:sp>
@@ -15626,7 +15795,6 @@
               <a:rPr lang="en-US" b="1" dirty="0" smtClean="0"/>
               <a:t>Introduction to Pilot Data</a:t>
             </a:r>
-            <a:endParaRPr lang="en-US" b="1" dirty="0" smtClean="0"/>
           </a:p>
           <a:p>
             <a:pPr>
@@ -15934,18 +16102,18 @@
     </p:spTree>
     <p:extLst>
       <p:ext uri="{BB962C8B-B14F-4D97-AF65-F5344CB8AC3E}">
-        <p14:creationId xmlns:p14="http://schemas.microsoft.com/office/powerpoint/2010/main" val="669391430"/>
+        <p14:creationId xmlns:p14="http://schemas.microsoft.com/office/powerpoint/2010/main" xmlns:p="http://schemas.openxmlformats.org/presentationml/2006/main" xmlns:r="http://schemas.openxmlformats.org/officeDocument/2006/relationships" xmlns:a="http://schemas.openxmlformats.org/drawingml/2006/main" xmlns="" val="669391430"/>
       </p:ext>
     </p:extLst>
   </p:cSld>
   <p:clrMapOvr>
     <a:masterClrMapping/>
   </p:clrMapOvr>
-  <p:transition xmlns:p14="http://schemas.microsoft.com/office/powerpoint/2010/main"/>
+  <p:transition/>
   <p:timing>
     <p:tnLst>
       <p:par>
-        <p:cTn xmlns:p14="http://schemas.microsoft.com/office/powerpoint/2010/main" id="1" dur="indefinite" restart="never" nodeType="tmRoot"/>
+        <p:cTn id="1" dur="indefinite" restart="never" nodeType="tmRoot"/>
       </p:par>
     </p:tnLst>
   </p:timing>
@@ -15953,7 +16121,7 @@
 </file>
 
 <file path=ppt/slides/slide18.xml><?xml version="1.0" encoding="utf-8"?>
-<p:sld xmlns:a="http://schemas.openxmlformats.org/drawingml/2006/main" xmlns:r="http://schemas.openxmlformats.org/officeDocument/2006/relationships" xmlns:p="http://schemas.openxmlformats.org/presentationml/2006/main">
+<p:sld xmlns:a="http://schemas.openxmlformats.org/drawingml/2006/main" xmlns:r="http://schemas.openxmlformats.org/officeDocument/2006/relationships" xmlns:mc="http://schemas.openxmlformats.org/markup-compatibility/2006" xmlns:mv="urn:schemas-microsoft-com:mac:vml" xmlns:p="http://schemas.openxmlformats.org/presentationml/2006/main" mc:Ignorable="mv" mc:PreserveAttributes="mv:*">
   <p:cSld>
     <p:spTree>
       <p:nvGrpSpPr>
@@ -15990,9 +16158,6 @@
               </a:rPr>
               <a:t>Using Remote Pilot Data</a:t>
             </a:r>
-            <a:endParaRPr lang="en-US" sz="2800" dirty="0" smtClean="0">
-              <a:ea typeface="ＭＳ Ｐゴシック" pitchFamily="34" charset="-128"/>
-            </a:endParaRPr>
           </a:p>
         </p:txBody>
       </p:sp>
@@ -16035,7 +16200,6 @@
               <a:rPr lang="en-US" b="1" dirty="0" smtClean="0"/>
               <a:t>Using Remote Pilot Data</a:t>
             </a:r>
-            <a:endParaRPr lang="en-US" b="1" dirty="0" smtClean="0"/>
           </a:p>
           <a:p>
             <a:pPr>
@@ -16343,18 +16507,18 @@
     </p:spTree>
     <p:extLst>
       <p:ext uri="{BB962C8B-B14F-4D97-AF65-F5344CB8AC3E}">
-        <p14:creationId xmlns:p14="http://schemas.microsoft.com/office/powerpoint/2010/main" val="820625316"/>
+        <p14:creationId xmlns:p14="http://schemas.microsoft.com/office/powerpoint/2010/main" xmlns:p="http://schemas.openxmlformats.org/presentationml/2006/main" xmlns:r="http://schemas.openxmlformats.org/officeDocument/2006/relationships" xmlns:a="http://schemas.openxmlformats.org/drawingml/2006/main" xmlns="" val="820625316"/>
       </p:ext>
     </p:extLst>
   </p:cSld>
   <p:clrMapOvr>
     <a:masterClrMapping/>
   </p:clrMapOvr>
-  <p:transition xmlns:p14="http://schemas.microsoft.com/office/powerpoint/2010/main"/>
+  <p:transition/>
   <p:timing>
     <p:tnLst>
       <p:par>
-        <p:cTn xmlns:p14="http://schemas.microsoft.com/office/powerpoint/2010/main" id="1" dur="indefinite" restart="never" nodeType="tmRoot"/>
+        <p:cTn id="1" dur="indefinite" restart="never" nodeType="tmRoot"/>
       </p:par>
     </p:tnLst>
   </p:timing>
@@ -16362,7 +16526,7 @@
 </file>
 
 <file path=ppt/slides/slide19.xml><?xml version="1.0" encoding="utf-8"?>
-<p:sld xmlns:a="http://schemas.openxmlformats.org/drawingml/2006/main" xmlns:r="http://schemas.openxmlformats.org/officeDocument/2006/relationships" xmlns:p="http://schemas.openxmlformats.org/presentationml/2006/main">
+<p:sld xmlns:a="http://schemas.openxmlformats.org/drawingml/2006/main" xmlns:r="http://schemas.openxmlformats.org/officeDocument/2006/relationships" xmlns:mc="http://schemas.openxmlformats.org/markup-compatibility/2006" xmlns:mv="urn:schemas-microsoft-com:mac:vml" xmlns:p="http://schemas.openxmlformats.org/presentationml/2006/main" mc:Ignorable="mv" mc:PreserveAttributes="mv:*">
   <p:cSld>
     <p:spTree>
       <p:nvGrpSpPr>
@@ -16410,18 +16574,18 @@
     </p:spTree>
     <p:extLst>
       <p:ext uri="{BB962C8B-B14F-4D97-AF65-F5344CB8AC3E}">
-        <p14:creationId xmlns:p14="http://schemas.microsoft.com/office/powerpoint/2010/main" val="4188414014"/>
+        <p14:creationId xmlns:p14="http://schemas.microsoft.com/office/powerpoint/2010/main" xmlns:p="http://schemas.openxmlformats.org/presentationml/2006/main" xmlns:r="http://schemas.openxmlformats.org/officeDocument/2006/relationships" xmlns:a="http://schemas.openxmlformats.org/drawingml/2006/main" xmlns="" val="4188414014"/>
       </p:ext>
     </p:extLst>
   </p:cSld>
   <p:clrMapOvr>
     <a:masterClrMapping/>
   </p:clrMapOvr>
-  <p:transition xmlns:p14="http://schemas.microsoft.com/office/powerpoint/2010/main"/>
+  <p:transition/>
   <p:timing>
     <p:tnLst>
       <p:par>
-        <p:cTn xmlns:p14="http://schemas.microsoft.com/office/powerpoint/2010/main" id="1" dur="indefinite" restart="never" nodeType="tmRoot"/>
+        <p:cTn id="1" dur="indefinite" restart="never" nodeType="tmRoot"/>
       </p:par>
     </p:tnLst>
   </p:timing>
@@ -16429,7 +16593,7 @@
 </file>
 
 <file path=ppt/slides/slide2.xml><?xml version="1.0" encoding="utf-8"?>
-<p:sld xmlns:a="http://schemas.openxmlformats.org/drawingml/2006/main" xmlns:r="http://schemas.openxmlformats.org/officeDocument/2006/relationships" xmlns:p="http://schemas.openxmlformats.org/presentationml/2006/main">
+<p:sld xmlns:a="http://schemas.openxmlformats.org/drawingml/2006/main" xmlns:r="http://schemas.openxmlformats.org/officeDocument/2006/relationships" xmlns:mc="http://schemas.openxmlformats.org/markup-compatibility/2006" xmlns:mv="urn:schemas-microsoft-com:mac:vml" xmlns:p="http://schemas.openxmlformats.org/presentationml/2006/main" mc:Ignorable="mv" mc:PreserveAttributes="mv:*">
   <p:cSld>
     <p:spTree>
       <p:nvGrpSpPr>
@@ -16506,8 +16670,23 @@
                 </a:solidFill>
                 <a:ea typeface="ＭＳ Ｐゴシック" pitchFamily="34" charset="-128"/>
               </a:rPr>
-              <a:t>Text placeholder</a:t>
-            </a:r>
+              <a:t>Introduction and overview [</a:t>
+            </a:r>
+            <a:r>
+              <a:rPr lang="en-US" dirty="0" smtClean="0">
+                <a:solidFill>
+                  <a:srgbClr val="595959"/>
+                </a:solidFill>
+                <a:ea typeface="ＭＳ Ｐゴシック" pitchFamily="34" charset="-128"/>
+              </a:rPr>
+              <a:t>1hour]</a:t>
+            </a:r>
+            <a:endParaRPr lang="en-US" dirty="0" smtClean="0">
+              <a:solidFill>
+                <a:srgbClr val="595959"/>
+              </a:solidFill>
+              <a:ea typeface="ＭＳ Ｐゴシック" pitchFamily="34" charset="-128"/>
+            </a:endParaRPr>
           </a:p>
           <a:p>
             <a:pPr marL="341313" indent="-341313" defTabSz="912813">
@@ -16520,12 +16699,15 @@
               <a:buFont typeface="Wingdings 2" pitchFamily="18" charset="2"/>
               <a:buChar char=""/>
             </a:pPr>
-            <a:endParaRPr lang="en-US" dirty="0" smtClean="0">
-              <a:solidFill>
-                <a:srgbClr val="595959"/>
-              </a:solidFill>
-              <a:ea typeface="ＭＳ Ｐゴシック" pitchFamily="34" charset="-128"/>
-            </a:endParaRPr>
+            <a:r>
+              <a:rPr lang="en-US" sz="1800" dirty="0" smtClean="0">
+                <a:solidFill>
+                  <a:srgbClr val="595959"/>
+                </a:solidFill>
+                <a:ea typeface="ＭＳ Ｐゴシック" pitchFamily="34" charset="-128"/>
+              </a:rPr>
+              <a:t>Hands-on session [2 hours]</a:t>
+            </a:r>
           </a:p>
           <a:p>
             <a:pPr marL="741363" lvl="1" indent="-341313" defTabSz="912813">
@@ -16538,50 +16720,16 @@
               <a:buFont typeface="Wingdings 2" pitchFamily="18" charset="2"/>
               <a:buChar char=""/>
             </a:pPr>
+            <a:r>
+              <a:rPr lang="en-US" sz="1400" dirty="0" smtClean="0">
+                <a:solidFill>
+                  <a:srgbClr val="595959"/>
+                </a:solidFill>
+                <a:ea typeface="ＭＳ Ｐゴシック" pitchFamily="34" charset="-128"/>
+              </a:rPr>
+              <a:t>Make consistent</a:t>
+            </a:r>
             <a:endParaRPr lang="en-US" sz="1400" dirty="0" smtClean="0">
-              <a:solidFill>
-                <a:srgbClr val="595959"/>
-              </a:solidFill>
-              <a:ea typeface="ＭＳ Ｐゴシック" pitchFamily="34" charset="-128"/>
-            </a:endParaRPr>
-          </a:p>
-          <a:p>
-            <a:pPr marL="741363" lvl="1" indent="-341313" defTabSz="912813">
-              <a:spcBef>
-                <a:spcPts val="2000"/>
-              </a:spcBef>
-              <a:buClr>
-                <a:srgbClr val="404040"/>
-              </a:buClr>
-              <a:buFont typeface="Wingdings 2" pitchFamily="18" charset="2"/>
-              <a:buChar char=""/>
-            </a:pPr>
-            <a:endParaRPr lang="en-US" b="1" dirty="0" smtClean="0">
-              <a:solidFill>
-                <a:srgbClr val="595959"/>
-              </a:solidFill>
-              <a:ea typeface="ＭＳ Ｐゴシック" pitchFamily="34" charset="-128"/>
-            </a:endParaRPr>
-          </a:p>
-          <a:p>
-            <a:pPr marL="1033463" lvl="2" indent="-347663" defTabSz="912813">
-              <a:spcBef>
-                <a:spcPts val="600"/>
-              </a:spcBef>
-              <a:buClr>
-                <a:srgbClr val="404040"/>
-              </a:buClr>
-            </a:pPr>
-            <a:endParaRPr lang="en-US" sz="1800" dirty="0" smtClean="0">
-              <a:solidFill>
-                <a:srgbClr val="595959"/>
-              </a:solidFill>
-              <a:ea typeface="ＭＳ Ｐゴシック" pitchFamily="34" charset="-128"/>
-            </a:endParaRPr>
-          </a:p>
-          <a:p>
-            <a:pPr marL="341313" indent="-341313" defTabSz="912813"/>
-            <a:endParaRPr lang="en-US" sz="1800" dirty="0" smtClean="0">
               <a:solidFill>
                 <a:srgbClr val="595959"/>
               </a:solidFill>
@@ -16802,7 +16950,7 @@
   <p:timing>
     <p:tnLst>
       <p:par>
-        <p:cTn xmlns:p14="http://schemas.microsoft.com/office/powerpoint/2010/main" id="1" dur="indefinite" restart="never" nodeType="tmRoot"/>
+        <p:cTn id="1" dur="indefinite" restart="never" nodeType="tmRoot"/>
       </p:par>
     </p:tnLst>
   </p:timing>
@@ -16810,7 +16958,7 @@
 </file>
 
 <file path=ppt/slides/slide3.xml><?xml version="1.0" encoding="utf-8"?>
-<p:sld xmlns:a="http://schemas.openxmlformats.org/drawingml/2006/main" xmlns:r="http://schemas.openxmlformats.org/officeDocument/2006/relationships" xmlns:p="http://schemas.openxmlformats.org/presentationml/2006/main">
+<p:sld xmlns:a="http://schemas.openxmlformats.org/drawingml/2006/main" xmlns:r="http://schemas.openxmlformats.org/officeDocument/2006/relationships" xmlns:mc="http://schemas.openxmlformats.org/markup-compatibility/2006" xmlns:mv="urn:schemas-microsoft-com:mac:vml" xmlns:p="http://schemas.openxmlformats.org/presentationml/2006/main" mc:Ignorable="mv" mc:PreserveAttributes="mv:*">
   <p:cSld>
     <p:spTree>
       <p:nvGrpSpPr>
@@ -17160,7 +17308,7 @@
   <p:timing>
     <p:tnLst>
       <p:par>
-        <p:cTn xmlns:p14="http://schemas.microsoft.com/office/powerpoint/2010/main" id="1" dur="indefinite" restart="never" nodeType="tmRoot"/>
+        <p:cTn id="1" dur="indefinite" restart="never" nodeType="tmRoot"/>
       </p:par>
     </p:tnLst>
   </p:timing>
@@ -17168,7 +17316,7 @@
 </file>
 
 <file path=ppt/slides/slide4.xml><?xml version="1.0" encoding="utf-8"?>
-<p:sld xmlns:a="http://schemas.openxmlformats.org/drawingml/2006/main" xmlns:r="http://schemas.openxmlformats.org/officeDocument/2006/relationships" xmlns:p="http://schemas.openxmlformats.org/presentationml/2006/main">
+<p:sld xmlns:a="http://schemas.openxmlformats.org/drawingml/2006/main" xmlns:r="http://schemas.openxmlformats.org/officeDocument/2006/relationships" xmlns:mc="http://schemas.openxmlformats.org/markup-compatibility/2006" xmlns:mv="urn:schemas-microsoft-com:mac:vml" xmlns:p="http://schemas.openxmlformats.org/presentationml/2006/main" mc:Ignorable="mv" mc:PreserveAttributes="mv:*">
   <p:cSld>
     <p:spTree>
       <p:nvGrpSpPr>
@@ -17561,11 +17709,11 @@
   <p:clrMapOvr>
     <a:masterClrMapping/>
   </p:clrMapOvr>
-  <p:transition xmlns:p14="http://schemas.microsoft.com/office/powerpoint/2010/main"/>
+  <p:transition/>
   <p:timing>
     <p:tnLst>
       <p:par>
-        <p:cTn xmlns:p14="http://schemas.microsoft.com/office/powerpoint/2010/main" id="1" dur="indefinite" restart="never" nodeType="tmRoot"/>
+        <p:cTn id="1" dur="indefinite" restart="never" nodeType="tmRoot"/>
       </p:par>
     </p:tnLst>
   </p:timing>
@@ -17573,7 +17721,7 @@
 </file>
 
 <file path=ppt/slides/slide5.xml><?xml version="1.0" encoding="utf-8"?>
-<p:sld xmlns:a="http://schemas.openxmlformats.org/drawingml/2006/main" xmlns:r="http://schemas.openxmlformats.org/officeDocument/2006/relationships" xmlns:p="http://schemas.openxmlformats.org/presentationml/2006/main">
+<p:sld xmlns:a="http://schemas.openxmlformats.org/drawingml/2006/main" xmlns:r="http://schemas.openxmlformats.org/officeDocument/2006/relationships" xmlns:mc="http://schemas.openxmlformats.org/markup-compatibility/2006" xmlns:mv="urn:schemas-microsoft-com:mac:vml" xmlns:p="http://schemas.openxmlformats.org/presentationml/2006/main" mc:Ignorable="mv" mc:PreserveAttributes="mv:*">
   <p:cSld>
     <p:spTree>
       <p:nvGrpSpPr>
@@ -17971,18 +18119,18 @@
     </p:spTree>
     <p:extLst>
       <p:ext uri="{BB962C8B-B14F-4D97-AF65-F5344CB8AC3E}">
-        <p14:creationId xmlns:p14="http://schemas.microsoft.com/office/powerpoint/2010/main" val="2817618227"/>
+        <p14:creationId xmlns:p14="http://schemas.microsoft.com/office/powerpoint/2010/main" xmlns:p="http://schemas.openxmlformats.org/presentationml/2006/main" xmlns:r="http://schemas.openxmlformats.org/officeDocument/2006/relationships" xmlns:a="http://schemas.openxmlformats.org/drawingml/2006/main" xmlns="" val="2817618227"/>
       </p:ext>
     </p:extLst>
   </p:cSld>
   <p:clrMapOvr>
     <a:masterClrMapping/>
   </p:clrMapOvr>
-  <p:transition xmlns:p14="http://schemas.microsoft.com/office/powerpoint/2010/main"/>
+  <p:transition/>
   <p:timing>
     <p:tnLst>
       <p:par>
-        <p:cTn xmlns:p14="http://schemas.microsoft.com/office/powerpoint/2010/main" id="1" dur="indefinite" restart="never" nodeType="tmRoot"/>
+        <p:cTn id="1" dur="indefinite" restart="never" nodeType="tmRoot"/>
       </p:par>
     </p:tnLst>
   </p:timing>
@@ -17990,7 +18138,7 @@
 </file>
 
 <file path=ppt/slides/slide6.xml><?xml version="1.0" encoding="utf-8"?>
-<p:sld xmlns:a="http://schemas.openxmlformats.org/drawingml/2006/main" xmlns:r="http://schemas.openxmlformats.org/officeDocument/2006/relationships" xmlns:p="http://schemas.openxmlformats.org/presentationml/2006/main">
+<p:sld xmlns:a="http://schemas.openxmlformats.org/drawingml/2006/main" xmlns:r="http://schemas.openxmlformats.org/officeDocument/2006/relationships" xmlns:mc="http://schemas.openxmlformats.org/markup-compatibility/2006" xmlns:mv="urn:schemas-microsoft-com:mac:vml" xmlns:p="http://schemas.openxmlformats.org/presentationml/2006/main" mc:Ignorable="mv" mc:PreserveAttributes="mv:*">
   <p:cSld>
     <p:spTree>
       <p:nvGrpSpPr>
@@ -18415,18 +18563,18 @@
     </p:spTree>
     <p:extLst>
       <p:ext uri="{BB962C8B-B14F-4D97-AF65-F5344CB8AC3E}">
-        <p14:creationId xmlns:p14="http://schemas.microsoft.com/office/powerpoint/2010/main" val="1986505638"/>
+        <p14:creationId xmlns:p14="http://schemas.microsoft.com/office/powerpoint/2010/main" xmlns:p="http://schemas.openxmlformats.org/presentationml/2006/main" xmlns:r="http://schemas.openxmlformats.org/officeDocument/2006/relationships" xmlns:a="http://schemas.openxmlformats.org/drawingml/2006/main" xmlns="" val="1986505638"/>
       </p:ext>
     </p:extLst>
   </p:cSld>
   <p:clrMapOvr>
     <a:masterClrMapping/>
   </p:clrMapOvr>
-  <p:transition xmlns:p14="http://schemas.microsoft.com/office/powerpoint/2010/main"/>
+  <p:transition/>
   <p:timing>
     <p:tnLst>
       <p:par>
-        <p:cTn xmlns:p14="http://schemas.microsoft.com/office/powerpoint/2010/main" id="1" dur="indefinite" restart="never" nodeType="tmRoot"/>
+        <p:cTn id="1" dur="indefinite" restart="never" nodeType="tmRoot"/>
       </p:par>
     </p:tnLst>
   </p:timing>
@@ -18434,7 +18582,7 @@
 </file>
 
 <file path=ppt/slides/slide7.xml><?xml version="1.0" encoding="utf-8"?>
-<p:sld xmlns:a="http://schemas.openxmlformats.org/drawingml/2006/main" xmlns:r="http://schemas.openxmlformats.org/officeDocument/2006/relationships" xmlns:p="http://schemas.openxmlformats.org/presentationml/2006/main">
+<p:sld xmlns:a="http://schemas.openxmlformats.org/drawingml/2006/main" xmlns:r="http://schemas.openxmlformats.org/officeDocument/2006/relationships" xmlns:mc="http://schemas.openxmlformats.org/markup-compatibility/2006" xmlns:mv="urn:schemas-microsoft-com:mac:vml" xmlns:p="http://schemas.openxmlformats.org/presentationml/2006/main" mc:Ignorable="mv" mc:PreserveAttributes="mv:*">
   <p:cSld>
     <p:spTree>
       <p:nvGrpSpPr>
@@ -18591,18 +18739,18 @@
     </p:spTree>
     <p:extLst>
       <p:ext uri="{BB962C8B-B14F-4D97-AF65-F5344CB8AC3E}">
-        <p14:creationId xmlns:p14="http://schemas.microsoft.com/office/powerpoint/2010/main" val="1455570638"/>
+        <p14:creationId xmlns:p14="http://schemas.microsoft.com/office/powerpoint/2010/main" xmlns:p="http://schemas.openxmlformats.org/presentationml/2006/main" xmlns:r="http://schemas.openxmlformats.org/officeDocument/2006/relationships" xmlns:a="http://schemas.openxmlformats.org/drawingml/2006/main" xmlns="" val="1455570638"/>
       </p:ext>
     </p:extLst>
   </p:cSld>
   <p:clrMapOvr>
     <a:masterClrMapping/>
   </p:clrMapOvr>
-  <p:transition xmlns:p14="http://schemas.microsoft.com/office/powerpoint/2010/main"/>
+  <p:transition/>
   <p:timing>
     <p:tnLst>
       <p:par>
-        <p:cTn xmlns:p14="http://schemas.microsoft.com/office/powerpoint/2010/main" id="1" dur="indefinite" restart="never" nodeType="tmRoot"/>
+        <p:cTn id="1" dur="indefinite" restart="never" nodeType="tmRoot"/>
       </p:par>
     </p:tnLst>
   </p:timing>
@@ -18610,7 +18758,7 @@
 </file>
 
 <file path=ppt/slides/slide8.xml><?xml version="1.0" encoding="utf-8"?>
-<p:sld xmlns:a="http://schemas.openxmlformats.org/drawingml/2006/main" xmlns:r="http://schemas.openxmlformats.org/officeDocument/2006/relationships" xmlns:p="http://schemas.openxmlformats.org/presentationml/2006/main">
+<p:sld xmlns:a="http://schemas.openxmlformats.org/drawingml/2006/main" xmlns:r="http://schemas.openxmlformats.org/officeDocument/2006/relationships" xmlns:mc="http://schemas.openxmlformats.org/markup-compatibility/2006" xmlns:mv="urn:schemas-microsoft-com:mac:vml" xmlns:p="http://schemas.openxmlformats.org/presentationml/2006/main" mc:Ignorable="mv" mc:PreserveAttributes="mv:*">
   <p:cSld>
     <p:spTree>
       <p:nvGrpSpPr>
@@ -18717,11 +18865,7 @@
             </a:r>
             <a:r>
               <a:rPr lang="en-US" dirty="0" smtClean="0"/>
-              <a:t>Specifies the name of the job queue to be </a:t>
-            </a:r>
-            <a:r>
-              <a:rPr lang="en-US" dirty="0" smtClean="0"/>
-              <a:t>used</a:t>
+              <a:t>Specifies the name of the job queue to be used</a:t>
             </a:r>
           </a:p>
           <a:p>
@@ -18797,11 +18941,11 @@
   <p:clrMapOvr>
     <a:masterClrMapping/>
   </p:clrMapOvr>
-  <p:transition xmlns:p14="http://schemas.microsoft.com/office/powerpoint/2010/main"/>
+  <p:transition/>
   <p:timing>
     <p:tnLst>
       <p:par>
-        <p:cTn xmlns:p14="http://schemas.microsoft.com/office/powerpoint/2010/main" id="1" dur="indefinite" restart="never" nodeType="tmRoot"/>
+        <p:cTn id="1" dur="indefinite" restart="never" nodeType="tmRoot"/>
       </p:par>
     </p:tnLst>
   </p:timing>
@@ -18809,7 +18953,7 @@
 </file>
 
 <file path=ppt/slides/slide9.xml><?xml version="1.0" encoding="utf-8"?>
-<p:sld xmlns:a="http://schemas.openxmlformats.org/drawingml/2006/main" xmlns:r="http://schemas.openxmlformats.org/officeDocument/2006/relationships" xmlns:p="http://schemas.openxmlformats.org/presentationml/2006/main">
+<p:sld xmlns:a="http://schemas.openxmlformats.org/drawingml/2006/main" xmlns:r="http://schemas.openxmlformats.org/officeDocument/2006/relationships" xmlns:mc="http://schemas.openxmlformats.org/markup-compatibility/2006" xmlns:mv="urn:schemas-microsoft-com:mac:vml" xmlns:p="http://schemas.openxmlformats.org/presentationml/2006/main" mc:Ignorable="mv" mc:PreserveAttributes="mv:*">
   <p:cSld>
     <p:spTree>
       <p:nvGrpSpPr>
@@ -19531,18 +19675,18 @@
     </p:spTree>
     <p:extLst>
       <p:ext uri="{BB962C8B-B14F-4D97-AF65-F5344CB8AC3E}">
-        <p14:creationId xmlns:p14="http://schemas.microsoft.com/office/powerpoint/2010/main" val="829288261"/>
+        <p14:creationId xmlns:p14="http://schemas.microsoft.com/office/powerpoint/2010/main" xmlns:p="http://schemas.openxmlformats.org/presentationml/2006/main" xmlns:r="http://schemas.openxmlformats.org/officeDocument/2006/relationships" xmlns:a="http://schemas.openxmlformats.org/drawingml/2006/main" xmlns="" val="829288261"/>
       </p:ext>
     </p:extLst>
   </p:cSld>
   <p:clrMapOvr>
     <a:masterClrMapping/>
   </p:clrMapOvr>
-  <p:transition xmlns:p14="http://schemas.microsoft.com/office/powerpoint/2010/main"/>
+  <p:transition/>
   <p:timing>
     <p:tnLst>
       <p:par>
-        <p:cTn xmlns:p14="http://schemas.microsoft.com/office/powerpoint/2010/main" id="1" dur="indefinite" restart="never" nodeType="tmRoot"/>
+        <p:cTn id="1" dur="indefinite" restart="never" nodeType="tmRoot"/>
       </p:par>
     </p:tnLst>
   </p:timing>

</xml_diff>